<commit_message>
Ajout du diag activité pour le use case commander pizza p33 des specifications
</commit_message>
<xml_diff>
--- a/SOLUTION FONCTIONNELLE  & TECHNIQUE.pptx
+++ b/SOLUTION FONCTIONNELLE  & TECHNIQUE.pptx
@@ -397,7 +397,7 @@
           <a:p>
             <a:fld id="{78ABE3C1-DBE1-495D-B57B-2849774B866A}" type="datetimeFigureOut">
               <a:rPr lang="en-US" dirty="0"/>
-              <a:t>7/26/2018</a:t>
+              <a:t>7/27/2018</a:t>
             </a:fld>
             <a:endParaRPr lang="en-US" dirty="0"/>
           </a:p>
@@ -806,7 +806,7 @@
           <a:p>
             <a:fld id="{446C117F-5CCF-4837-BE5F-2B92066CAFAF}" type="datetimeFigureOut">
               <a:rPr lang="en-US" dirty="0"/>
-              <a:t>7/26/2018</a:t>
+              <a:t>7/27/2018</a:t>
             </a:fld>
             <a:endParaRPr lang="en-US" dirty="0"/>
           </a:p>
@@ -1137,7 +1137,7 @@
           <a:p>
             <a:fld id="{84EB90BD-B6CE-46B7-997F-7313B992CCDC}" type="datetimeFigureOut">
               <a:rPr lang="en-US" dirty="0"/>
-              <a:t>7/26/2018</a:t>
+              <a:t>7/27/2018</a:t>
             </a:fld>
             <a:endParaRPr lang="en-US" dirty="0"/>
           </a:p>
@@ -1537,7 +1537,7 @@
           <a:p>
             <a:fld id="{CDB9D11F-B188-461D-B23F-39381795C052}" type="datetimeFigureOut">
               <a:rPr lang="en-US" dirty="0"/>
-              <a:t>7/26/2018</a:t>
+              <a:t>7/27/2018</a:t>
             </a:fld>
             <a:endParaRPr lang="en-US" dirty="0"/>
           </a:p>
@@ -2100,7 +2100,7 @@
           <a:p>
             <a:fld id="{52E6D8D9-55A2-4063-B0F3-121F44549695}" type="datetimeFigureOut">
               <a:rPr lang="en-US" dirty="0"/>
-              <a:t>7/26/2018</a:t>
+              <a:t>7/27/2018</a:t>
             </a:fld>
             <a:endParaRPr lang="en-US" dirty="0"/>
           </a:p>
@@ -2776,7 +2776,7 @@
           <a:p>
             <a:fld id="{D4B24536-994D-4021-A283-9F449C0DB509}" type="datetimeFigureOut">
               <a:rPr lang="en-US" dirty="0"/>
-              <a:t>7/26/2018</a:t>
+              <a:t>7/27/2018</a:t>
             </a:fld>
             <a:endParaRPr lang="en-US" dirty="0"/>
           </a:p>
@@ -3684,7 +3684,7 @@
           <a:p>
             <a:fld id="{3CBBBB78-C96F-47B7-AB17-D852CA960AC9}" type="datetimeFigureOut">
               <a:rPr lang="en-US" dirty="0"/>
-              <a:t>7/26/2018</a:t>
+              <a:t>7/27/2018</a:t>
             </a:fld>
             <a:endParaRPr lang="en-US" dirty="0"/>
           </a:p>
@@ -3992,7 +3992,7 @@
           <a:p>
             <a:fld id="{1FA3F48C-C7C6-4055-9F49-3777875E72AE}" type="datetimeFigureOut">
               <a:rPr lang="en-US" dirty="0"/>
-              <a:t>7/26/2018</a:t>
+              <a:t>7/27/2018</a:t>
             </a:fld>
             <a:endParaRPr lang="en-US" dirty="0"/>
           </a:p>
@@ -4251,7 +4251,7 @@
           <a:p>
             <a:fld id="{6178E61D-D431-422C-9764-11DAFE33AB63}" type="datetimeFigureOut">
               <a:rPr lang="en-US" dirty="0"/>
-              <a:t>7/26/2018</a:t>
+              <a:t>7/27/2018</a:t>
             </a:fld>
             <a:endParaRPr lang="en-US" dirty="0"/>
           </a:p>
@@ -4570,7 +4570,7 @@
           <a:p>
             <a:fld id="{12DE42F4-6EEF-4EF7-8ED4-2208F0F89A08}" type="datetimeFigureOut">
               <a:rPr lang="en-US" dirty="0"/>
-              <a:t>7/26/2018</a:t>
+              <a:t>7/27/2018</a:t>
             </a:fld>
             <a:endParaRPr lang="en-US" dirty="0"/>
           </a:p>
@@ -4954,7 +4954,7 @@
           <a:p>
             <a:fld id="{30578ACC-22D6-47C1-A373-4FD133E34F3C}" type="datetimeFigureOut">
               <a:rPr lang="en-US" dirty="0"/>
-              <a:t>7/26/2018</a:t>
+              <a:t>7/27/2018</a:t>
             </a:fld>
             <a:endParaRPr lang="en-US" dirty="0"/>
           </a:p>
@@ -5325,7 +5325,7 @@
           <a:p>
             <a:fld id="{4E5A6C69-6797-4E8A-BF37-F2C3751466E9}" type="datetimeFigureOut">
               <a:rPr lang="en-US" dirty="0"/>
-              <a:t>7/26/2018</a:t>
+              <a:t>7/27/2018</a:t>
             </a:fld>
             <a:endParaRPr lang="en-US" dirty="0"/>
           </a:p>
@@ -5826,7 +5826,7 @@
           <a:p>
             <a:fld id="{D82014A1-A632-4878-A0D3-F52BA7563730}" type="datetimeFigureOut">
               <a:rPr lang="en-US" dirty="0"/>
-              <a:t>7/26/2018</a:t>
+              <a:t>7/27/2018</a:t>
             </a:fld>
             <a:endParaRPr lang="en-US" dirty="0"/>
           </a:p>
@@ -6078,7 +6078,7 @@
           <a:p>
             <a:fld id="{CE99F462-093F-4566-844B-4C71F2739DA5}" type="datetimeFigureOut">
               <a:rPr lang="en-US" dirty="0"/>
-              <a:t>7/26/2018</a:t>
+              <a:t>7/27/2018</a:t>
             </a:fld>
             <a:endParaRPr lang="en-US" dirty="0"/>
           </a:p>
@@ -6236,7 +6236,7 @@
           <a:p>
             <a:fld id="{3D24A7AC-904D-4781-85BA-7D10C17ED021}" type="datetimeFigureOut">
               <a:rPr lang="en-US" dirty="0"/>
-              <a:t>7/26/2018</a:t>
+              <a:t>7/27/2018</a:t>
             </a:fld>
             <a:endParaRPr lang="en-US" dirty="0"/>
           </a:p>
@@ -6621,7 +6621,7 @@
           <a:p>
             <a:fld id="{E331444B-B92B-4E27-8C94-BB93EAF5CB18}" type="datetimeFigureOut">
               <a:rPr lang="en-US" dirty="0"/>
-              <a:t>7/26/2018</a:t>
+              <a:t>7/27/2018</a:t>
             </a:fld>
             <a:endParaRPr lang="en-US" dirty="0"/>
           </a:p>
@@ -7025,7 +7025,7 @@
           <a:p>
             <a:fld id="{363EFA5E-FA76-400D-B3DC-F0BA90E6D107}" type="datetimeFigureOut">
               <a:rPr lang="en-US" dirty="0"/>
-              <a:t>7/26/2018</a:t>
+              <a:t>7/27/2018</a:t>
             </a:fld>
             <a:endParaRPr lang="en-US" dirty="0"/>
           </a:p>
@@ -7264,7 +7264,7 @@
           <a:p>
             <a:fld id="{9D6E9DEC-419B-4CC5-A080-3B06BD5A8291}" type="datetimeFigureOut">
               <a:rPr lang="en-US" dirty="0"/>
-              <a:t>7/26/2018</a:t>
+              <a:t>7/27/2018</a:t>
             </a:fld>
             <a:endParaRPr lang="en-US" dirty="0"/>
           </a:p>
@@ -8115,11 +8115,7 @@
             </a:r>
             <a:r>
               <a:rPr lang="fr-FR" smtClean="0"/>
-              <a:t>de </a:t>
-            </a:r>
-            <a:r>
-              <a:rPr lang="fr-FR" smtClean="0"/>
-              <a:t>donner </a:t>
+              <a:t>de donner </a:t>
             </a:r>
             <a:r>
               <a:rPr lang="fr-FR" dirty="0" smtClean="0"/>
@@ -8942,7 +8938,7 @@
       </p:sp>
       <p:pic>
         <p:nvPicPr>
-          <p:cNvPr id="4" name="Espace réservé du contenu 3"/>
+          <p:cNvPr id="5" name="Espace réservé du contenu 4"/>
           <p:cNvPicPr>
             <a:picLocks noGrp="1" noChangeAspect="1"/>
           </p:cNvPicPr>
@@ -8958,8 +8954,8 @@
         </p:blipFill>
         <p:spPr>
           <a:xfrm>
-            <a:off x="617838" y="2051222"/>
-            <a:ext cx="9256702" cy="4399882"/>
+            <a:off x="419658" y="2078182"/>
+            <a:ext cx="9579817" cy="4370119"/>
           </a:xfrm>
           <a:prstGeom prst="rect">
             <a:avLst/>

</xml_diff>